<commit_message>
amount parameter for articles service
</commit_message>
<xml_diff>
--- a/cloud-native-starter.pptx
+++ b/cloud-native-starter.pptx
@@ -89,7 +89,7 @@
   </p:defaultTextStyle>
   <p:extLst>
     <p:ext uri="{EFAFB233-063F-42B5-8137-9DF3F51BA10A}">
-      <p15:sldGuideLst xmlns:p15="http://schemas.microsoft.com/office/powerpoint/2012/main" xmlns="">
+      <p15:sldGuideLst xmlns="" xmlns:p15="http://schemas.microsoft.com/office/powerpoint/2012/main">
         <p15:guide id="1" orient="horz" pos="2112" userDrawn="1">
           <p15:clr>
             <a:srgbClr val="A4A3A4"/>
@@ -2746,6 +2746,47 @@
           <a:chExt cx="0" cy="0"/>
         </a:xfrm>
       </p:grpSpPr>
+      <p:cxnSp>
+        <p:nvCxnSpPr>
+          <p:cNvPr id="95" name="Straight Arrow Connector 62"/>
+          <p:cNvCxnSpPr/>
+          <p:nvPr/>
+        </p:nvCxnSpPr>
+        <p:spPr>
+          <a:xfrm>
+            <a:off x="2988754" y="4029426"/>
+            <a:ext cx="5184964" cy="3103231"/>
+          </a:xfrm>
+          <a:prstGeom prst="straightConnector1">
+            <a:avLst/>
+          </a:prstGeom>
+          <a:noFill/>
+          <a:ln w="12700" cap="flat" cmpd="sng">
+            <a:solidFill>
+              <a:schemeClr val="bg1">
+                <a:lumMod val="85000"/>
+              </a:schemeClr>
+            </a:solidFill>
+            <a:prstDash val="solid"/>
+            <a:miter lim="400000"/>
+            <a:headEnd type="none"/>
+            <a:tailEnd type="none"/>
+          </a:ln>
+          <a:effectLst/>
+        </p:spPr>
+        <p:style>
+          <a:lnRef idx="0">
+            <a:scrgbClr r="0" g="0" b="0"/>
+          </a:lnRef>
+          <a:fillRef idx="0">
+            <a:scrgbClr r="0" g="0" b="0"/>
+          </a:fillRef>
+          <a:effectRef idx="0">
+            <a:scrgbClr r="0" g="0" b="0"/>
+          </a:effectRef>
+          <a:fontRef idx="none"/>
+        </p:style>
+      </p:cxnSp>
       <p:sp>
         <p:nvSpPr>
           <p:cNvPr id="148" name="Shape 62"/>
@@ -2888,7 +2929,7 @@
         </p:blipFill>
         <p:spPr>
           <a:xfrm>
-            <a:off x="560056" y="3814556"/>
+            <a:off x="560056" y="3547212"/>
             <a:ext cx="803034" cy="701972"/>
           </a:xfrm>
           <a:prstGeom prst="rect">
@@ -2904,7 +2945,7 @@
         </p:nvSpPr>
         <p:spPr>
           <a:xfrm>
-            <a:off x="375641" y="4524277"/>
+            <a:off x="375641" y="4256933"/>
             <a:ext cx="1181319" cy="264013"/>
           </a:xfrm>
           <a:prstGeom prst="rect">
@@ -2994,7 +3035,7 @@
         </p:blipFill>
         <p:spPr>
           <a:xfrm>
-            <a:off x="3878234" y="2796873"/>
+            <a:off x="3878234" y="2787325"/>
             <a:ext cx="819405" cy="786629"/>
           </a:xfrm>
           <a:prstGeom prst="rect">
@@ -3010,8 +3051,8 @@
         </p:nvCxnSpPr>
         <p:spPr>
           <a:xfrm flipV="1">
-            <a:off x="4756623" y="2642594"/>
-            <a:ext cx="1150216" cy="580176"/>
+            <a:off x="4745722" y="2664016"/>
+            <a:ext cx="1184043" cy="525162"/>
           </a:xfrm>
           <a:prstGeom prst="straightConnector1">
             <a:avLst/>
@@ -3051,7 +3092,7 @@
         </p:nvCxnSpPr>
         <p:spPr>
           <a:xfrm flipV="1">
-            <a:off x="1376340" y="4196026"/>
+            <a:off x="1376340" y="3928682"/>
             <a:ext cx="660501" cy="1"/>
           </a:xfrm>
           <a:prstGeom prst="straightConnector1">
@@ -3202,7 +3243,7 @@
         </p:blipFill>
         <p:spPr>
           <a:xfrm>
-            <a:off x="8446938" y="3686117"/>
+            <a:off x="8456487" y="3457020"/>
             <a:ext cx="697633" cy="697633"/>
           </a:xfrm>
           <a:prstGeom prst="rect">
@@ -3218,7 +3259,7 @@
         </p:nvSpPr>
         <p:spPr>
           <a:xfrm>
-            <a:off x="8201419" y="4375283"/>
+            <a:off x="8210968" y="4146186"/>
             <a:ext cx="1218324" cy="264013"/>
           </a:xfrm>
           <a:prstGeom prst="rect">
@@ -3294,7 +3335,7 @@
         <p:spPr>
           <a:xfrm>
             <a:off x="7884542" y="1619012"/>
-            <a:ext cx="661439" cy="246221"/>
+            <a:ext cx="1790554" cy="246221"/>
           </a:xfrm>
           <a:prstGeom prst="rect">
             <a:avLst/>
@@ -3341,7 +3382,7 @@
                 <a:latin typeface="Arial"/>
                 <a:cs typeface="Arial"/>
               </a:rPr>
-              <a:t>DBaaS</a:t>
+              <a:t>Managed Services</a:t>
             </a:r>
             <a:endParaRPr sz="1600" dirty="0">
               <a:solidFill>
@@ -3369,7 +3410,7 @@
         </p:blipFill>
         <p:spPr>
           <a:xfrm>
-            <a:off x="3630369" y="2472159"/>
+            <a:off x="3630369" y="2462611"/>
             <a:ext cx="831816" cy="524254"/>
           </a:xfrm>
           <a:prstGeom prst="rect">
@@ -3385,7 +3426,7 @@
         </p:nvSpPr>
         <p:spPr>
           <a:xfrm>
-            <a:off x="3549282" y="3512862"/>
+            <a:off x="3549282" y="3493766"/>
             <a:ext cx="1506878" cy="448679"/>
           </a:xfrm>
           <a:prstGeom prst="rect">
@@ -3447,8 +3488,22 @@
                 <a:cs typeface="Arial"/>
                 <a:sym typeface="Helvetica Light"/>
               </a:rPr>
-              <a:t>Articles Service API</a:t>
-            </a:r>
+              <a:t>Web-API</a:t>
+            </a:r>
+            <a:endParaRPr kumimoji="0" lang="en-US" sz="1200" b="0" i="0" u="none" strike="noStrike" cap="none" spc="0" normalizeH="0" baseline="0" dirty="0" smtClean="0">
+              <a:ln>
+                <a:noFill/>
+              </a:ln>
+              <a:solidFill>
+                <a:srgbClr val="000000"/>
+              </a:solidFill>
+              <a:effectLst/>
+              <a:uFillTx/>
+              <a:latin typeface="Arial"/>
+              <a:ea typeface="+mn-ea"/>
+              <a:cs typeface="Arial"/>
+              <a:sym typeface="Helvetica Light"/>
+            </a:endParaRPr>
           </a:p>
           <a:p>
             <a:pPr marL="0" marR="0" indent="0" defTabSz="584200" rtl="0" fontAlgn="auto" latinLnBrk="1" hangingPunct="0">
@@ -3502,7 +3557,7 @@
         </p:nvGrpSpPr>
         <p:grpSpPr>
           <a:xfrm>
-            <a:off x="2208255" y="3841537"/>
+            <a:off x="2208255" y="3574193"/>
             <a:ext cx="707233" cy="707234"/>
             <a:chOff x="3587103" y="3636248"/>
             <a:chExt cx="707233" cy="707234"/>
@@ -3632,7 +3687,7 @@
         </p:nvSpPr>
         <p:spPr>
           <a:xfrm>
-            <a:off x="1944801" y="4571267"/>
+            <a:off x="1944801" y="4303923"/>
             <a:ext cx="1218324" cy="264013"/>
           </a:xfrm>
           <a:prstGeom prst="rect">
@@ -3685,7 +3740,7 @@
         </p:nvGrpSpPr>
         <p:grpSpPr>
           <a:xfrm>
-            <a:off x="6061971" y="2296791"/>
+            <a:off x="6061971" y="2315887"/>
             <a:ext cx="707233" cy="707233"/>
             <a:chOff x="394759" y="4656919"/>
             <a:chExt cx="707233" cy="707233"/>
@@ -3823,7 +3878,7 @@
         </p:blipFill>
         <p:spPr>
           <a:xfrm>
-            <a:off x="5735740" y="1893723"/>
+            <a:off x="5735740" y="1912819"/>
             <a:ext cx="831816" cy="524254"/>
           </a:xfrm>
           <a:prstGeom prst="rect">
@@ -3907,8 +3962,8 @@
         </p:nvSpPr>
         <p:spPr>
           <a:xfrm>
-            <a:off x="5654653" y="2970365"/>
-            <a:ext cx="1506878" cy="448679"/>
+            <a:off x="5654653" y="3081794"/>
+            <a:ext cx="1506878" cy="264013"/>
           </a:xfrm>
           <a:prstGeom prst="rect">
             <a:avLst/>
@@ -3969,262 +4024,8 @@
                 <a:cs typeface="Arial"/>
                 <a:sym typeface="Helvetica Light"/>
               </a:rPr>
-              <a:t>Articles Core Service</a:t>
-            </a:r>
-          </a:p>
-          <a:p>
-            <a:pPr marL="0" marR="0" indent="0" defTabSz="584200" rtl="0" fontAlgn="auto" latinLnBrk="1" hangingPunct="0">
-              <a:lnSpc>
-                <a:spcPct val="100000"/>
-              </a:lnSpc>
-              <a:spcBef>
-                <a:spcPts val="0"/>
-              </a:spcBef>
-              <a:spcAft>
-                <a:spcPts val="0"/>
-              </a:spcAft>
-              <a:buClrTx/>
-              <a:buSzTx/>
-              <a:buFontTx/>
-              <a:buNone/>
-              <a:tabLst/>
-            </a:pPr>
-            <a:r>
-              <a:rPr lang="en-US" sz="1200" dirty="0" smtClean="0">
-                <a:solidFill>
-                  <a:srgbClr val="000000"/>
-                </a:solidFill>
-                <a:latin typeface="Arial"/>
-                <a:cs typeface="Arial"/>
-              </a:rPr>
-              <a:t>v1</a:t>
-            </a:r>
-            <a:endParaRPr kumimoji="0" lang="en-US" sz="1200" b="0" i="0" u="none" strike="noStrike" cap="none" spc="0" normalizeH="0" baseline="0" dirty="0">
-              <a:ln>
-                <a:noFill/>
-              </a:ln>
-              <a:solidFill>
-                <a:srgbClr val="000000"/>
-              </a:solidFill>
-              <a:effectLst/>
-              <a:uFillTx/>
-              <a:latin typeface="Arial"/>
-              <a:ea typeface="+mn-ea"/>
-              <a:cs typeface="Arial"/>
-              <a:sym typeface="Helvetica Light"/>
-            </a:endParaRPr>
-          </a:p>
-        </p:txBody>
-      </p:sp>
-      <p:grpSp>
-        <p:nvGrpSpPr>
-          <p:cNvPr id="81" name="Group 80"/>
-          <p:cNvGrpSpPr/>
-          <p:nvPr/>
-        </p:nvGrpSpPr>
-        <p:grpSpPr>
-          <a:xfrm>
-            <a:off x="6082575" y="3826937"/>
-            <a:ext cx="707233" cy="707233"/>
-            <a:chOff x="394759" y="4656919"/>
-            <a:chExt cx="707233" cy="707233"/>
-          </a:xfrm>
-        </p:grpSpPr>
-        <p:sp>
-          <p:nvSpPr>
-            <p:cNvPr id="82" name="Shape 272"/>
-            <p:cNvSpPr/>
-            <p:nvPr/>
-          </p:nvSpPr>
-          <p:spPr>
-            <a:xfrm>
-              <a:off x="394759" y="4656919"/>
-              <a:ext cx="707233" cy="707233"/>
-            </a:xfrm>
-            <a:custGeom>
-              <a:avLst/>
-              <a:gdLst/>
-              <a:ahLst/>
-              <a:cxnLst>
-                <a:cxn ang="0">
-                  <a:pos x="wd2" y="hd2"/>
-                </a:cxn>
-                <a:cxn ang="5400000">
-                  <a:pos x="wd2" y="hd2"/>
-                </a:cxn>
-                <a:cxn ang="10800000">
-                  <a:pos x="wd2" y="hd2"/>
-                </a:cxn>
-                <a:cxn ang="16200000">
-                  <a:pos x="wd2" y="hd2"/>
-                </a:cxn>
-              </a:cxnLst>
-              <a:rect l="0" t="0" r="r" b="b"/>
-              <a:pathLst>
-                <a:path w="19679" h="19679" extrusionOk="0">
-                  <a:moveTo>
-                    <a:pt x="16796" y="2882"/>
-                  </a:moveTo>
-                  <a:cubicBezTo>
-                    <a:pt x="20639" y="6724"/>
-                    <a:pt x="20639" y="12954"/>
-                    <a:pt x="16796" y="16796"/>
-                  </a:cubicBezTo>
-                  <a:cubicBezTo>
-                    <a:pt x="12954" y="20639"/>
-                    <a:pt x="6724" y="20639"/>
-                    <a:pt x="2882" y="16796"/>
-                  </a:cubicBezTo>
-                  <a:cubicBezTo>
-                    <a:pt x="-961" y="12954"/>
-                    <a:pt x="-961" y="6724"/>
-                    <a:pt x="2882" y="2882"/>
-                  </a:cubicBezTo>
-                  <a:cubicBezTo>
-                    <a:pt x="6724" y="-961"/>
-                    <a:pt x="12954" y="-961"/>
-                    <a:pt x="16796" y="2882"/>
-                  </a:cubicBezTo>
-                  <a:close/>
-                </a:path>
-              </a:pathLst>
-            </a:custGeom>
-            <a:solidFill>
-              <a:srgbClr val="8DC53F"/>
-            </a:solidFill>
-            <a:ln w="3175" cap="flat">
-              <a:noFill/>
-              <a:miter lim="400000"/>
-            </a:ln>
-            <a:effectLst/>
-          </p:spPr>
-          <p:txBody>
-            <a:bodyPr wrap="square" lIns="0" tIns="0" rIns="0" bIns="0" numCol="1" anchor="ctr">
-              <a:noAutofit/>
-            </a:bodyPr>
-            <a:lstStyle/>
-            <a:p>
-              <a:pPr lvl="0">
-                <a:defRPr sz="1800">
-                  <a:solidFill>
-                    <a:srgbClr val="FFFFFF"/>
-                  </a:solidFill>
-                </a:defRPr>
-              </a:pPr>
-              <a:endParaRPr/>
-            </a:p>
-          </p:txBody>
-        </p:sp>
-        <p:pic>
-          <p:nvPicPr>
-            <p:cNvPr id="83" name="_-13.png"/>
-            <p:cNvPicPr/>
-            <p:nvPr/>
-          </p:nvPicPr>
-          <p:blipFill>
-            <a:blip r:embed="rId8">
-              <a:extLst/>
-            </a:blip>
-            <a:srcRect l="19624" t="23468" r="19624" b="23468"/>
-            <a:stretch>
-              <a:fillRect/>
-            </a:stretch>
-          </p:blipFill>
-          <p:spPr>
-            <a:xfrm>
-              <a:off x="535947" y="4822892"/>
-              <a:ext cx="429660" cy="375287"/>
-            </a:xfrm>
-            <a:prstGeom prst="rect">
-              <a:avLst/>
-            </a:prstGeom>
-            <a:ln w="3175" cap="flat">
-              <a:noFill/>
-              <a:miter lim="400000"/>
-            </a:ln>
-            <a:effectLst/>
-          </p:spPr>
-        </p:pic>
-      </p:grpSp>
-      <p:pic>
-        <p:nvPicPr>
-          <p:cNvPr id="84" name="Picture 83"/>
-          <p:cNvPicPr>
-            <a:picLocks noChangeAspect="1"/>
-          </p:cNvPicPr>
-          <p:nvPr/>
-        </p:nvPicPr>
-        <p:blipFill>
-          <a:blip r:embed="rId6"/>
-          <a:stretch>
-            <a:fillRect/>
-          </a:stretch>
-        </p:blipFill>
-        <p:spPr>
-          <a:xfrm>
-            <a:off x="5756344" y="3423869"/>
-            <a:ext cx="831816" cy="524254"/>
-          </a:xfrm>
-          <a:prstGeom prst="rect">
-            <a:avLst/>
-          </a:prstGeom>
-        </p:spPr>
-      </p:pic>
-      <p:sp>
-        <p:nvSpPr>
-          <p:cNvPr id="85" name="TextBox 84"/>
-          <p:cNvSpPr txBox="1"/>
-          <p:nvPr/>
-        </p:nvSpPr>
-        <p:spPr>
-          <a:xfrm>
-            <a:off x="5675257" y="4500511"/>
-            <a:ext cx="1506878" cy="448679"/>
-          </a:xfrm>
-          <a:prstGeom prst="rect">
-            <a:avLst/>
-          </a:prstGeom>
-          <a:noFill/>
-          <a:ln w="3175" cap="flat">
-            <a:noFill/>
-            <a:miter lim="400000"/>
-          </a:ln>
-          <a:effectLst/>
-        </p:spPr>
-        <p:style>
-          <a:lnRef idx="0">
-            <a:scrgbClr r="0" g="0" b="0"/>
-          </a:lnRef>
-          <a:fillRef idx="0">
-            <a:scrgbClr r="0" g="0" b="0"/>
-          </a:fillRef>
-          <a:effectRef idx="0">
-            <a:scrgbClr r="0" g="0" b="0"/>
-          </a:effectRef>
-          <a:fontRef idx="none"/>
-        </p:style>
-        <p:txBody>
-          <a:bodyPr rot="0" spcFirstLastPara="1" vertOverflow="overflow" horzOverflow="overflow" vert="horz" wrap="square" lIns="39290" tIns="39290" rIns="39290" bIns="39290" numCol="1" spcCol="38100" rtlCol="0" anchor="ctr">
-            <a:spAutoFit/>
-          </a:bodyPr>
-          <a:lstStyle/>
-          <a:p>
-            <a:pPr marL="0" marR="0" indent="0" defTabSz="584200" rtl="0" fontAlgn="auto" latinLnBrk="1" hangingPunct="0">
-              <a:lnSpc>
-                <a:spcPct val="100000"/>
-              </a:lnSpc>
-              <a:spcBef>
-                <a:spcPts val="0"/>
-              </a:spcBef>
-              <a:spcAft>
-                <a:spcPts val="0"/>
-              </a:spcAft>
-              <a:buClrTx/>
-              <a:buSzTx/>
-              <a:buFontTx/>
-              <a:buNone/>
-              <a:tabLst/>
-            </a:pPr>
+              <a:t>Articles </a:t>
+            </a:r>
             <a:r>
               <a:rPr kumimoji="0" lang="en-US" sz="1200" b="0" i="0" u="none" strike="noStrike" cap="none" spc="0" normalizeH="0" baseline="0" dirty="0" smtClean="0">
                 <a:ln>
@@ -4240,37 +4041,9 @@
                 <a:cs typeface="Arial"/>
                 <a:sym typeface="Helvetica Light"/>
               </a:rPr>
-              <a:t>Articles Core Service</a:t>
-            </a:r>
-          </a:p>
-          <a:p>
-            <a:pPr marL="0" marR="0" indent="0" defTabSz="584200" rtl="0" fontAlgn="auto" latinLnBrk="1" hangingPunct="0">
-              <a:lnSpc>
-                <a:spcPct val="100000"/>
-              </a:lnSpc>
-              <a:spcBef>
-                <a:spcPts val="0"/>
-              </a:spcBef>
-              <a:spcAft>
-                <a:spcPts val="0"/>
-              </a:spcAft>
-              <a:buClrTx/>
-              <a:buSzTx/>
-              <a:buFontTx/>
-              <a:buNone/>
-              <a:tabLst/>
-            </a:pPr>
-            <a:r>
-              <a:rPr lang="en-US" sz="1200" dirty="0" smtClean="0">
-                <a:solidFill>
-                  <a:srgbClr val="000000"/>
-                </a:solidFill>
-                <a:latin typeface="Arial"/>
-                <a:cs typeface="Arial"/>
-              </a:rPr>
-              <a:t>v2</a:t>
-            </a:r>
-            <a:endParaRPr kumimoji="0" lang="en-US" sz="1200" b="0" i="0" u="none" strike="noStrike" cap="none" spc="0" normalizeH="0" baseline="0" dirty="0">
+              <a:t>Service</a:t>
+            </a:r>
+            <a:endParaRPr kumimoji="0" lang="en-US" sz="1200" b="0" i="0" u="none" strike="noStrike" cap="none" spc="0" normalizeH="0" baseline="0" dirty="0" smtClean="0">
               <a:ln>
                 <a:noFill/>
               </a:ln>
@@ -4289,47 +4062,6 @@
       </p:sp>
       <p:cxnSp>
         <p:nvCxnSpPr>
-          <p:cNvPr id="88" name="Straight Arrow Connector 62"/>
-          <p:cNvCxnSpPr/>
-          <p:nvPr/>
-        </p:nvCxnSpPr>
-        <p:spPr>
-          <a:xfrm>
-            <a:off x="4756623" y="3270692"/>
-            <a:ext cx="1150216" cy="910524"/>
-          </a:xfrm>
-          <a:prstGeom prst="straightConnector1">
-            <a:avLst/>
-          </a:prstGeom>
-          <a:noFill/>
-          <a:ln w="12700" cap="flat" cmpd="sng">
-            <a:solidFill>
-              <a:schemeClr val="bg1">
-                <a:lumMod val="85000"/>
-              </a:schemeClr>
-            </a:solidFill>
-            <a:prstDash val="solid"/>
-            <a:miter lim="400000"/>
-            <a:headEnd type="none"/>
-            <a:tailEnd type="none"/>
-          </a:ln>
-          <a:effectLst/>
-        </p:spPr>
-        <p:style>
-          <a:lnRef idx="0">
-            <a:scrgbClr r="0" g="0" b="0"/>
-          </a:lnRef>
-          <a:fillRef idx="0">
-            <a:scrgbClr r="0" g="0" b="0"/>
-          </a:fillRef>
-          <a:effectRef idx="0">
-            <a:scrgbClr r="0" g="0" b="0"/>
-          </a:effectRef>
-          <a:fontRef idx="none"/>
-        </p:style>
-      </p:cxnSp>
-      <p:cxnSp>
-        <p:nvCxnSpPr>
           <p:cNvPr id="92" name="Straight Arrow Connector 62"/>
           <p:cNvCxnSpPr>
             <a:endCxn id="216" idx="1"/>
@@ -4338,8 +4070,8 @@
         </p:nvCxnSpPr>
         <p:spPr>
           <a:xfrm flipV="1">
-            <a:off x="3031299" y="3190188"/>
-            <a:ext cx="846935" cy="943111"/>
+            <a:off x="3017401" y="3180640"/>
+            <a:ext cx="860833" cy="743765"/>
           </a:xfrm>
           <a:prstGeom prst="straightConnector1">
             <a:avLst/>
@@ -4387,7 +4119,7 @@
         </p:blipFill>
         <p:spPr>
           <a:xfrm>
-            <a:off x="3826949" y="5285505"/>
+            <a:off x="3874694" y="4187485"/>
             <a:ext cx="819405" cy="786629"/>
           </a:xfrm>
           <a:prstGeom prst="rect">
@@ -4403,7 +4135,7 @@
         </p:nvSpPr>
         <p:spPr>
           <a:xfrm>
-            <a:off x="3497997" y="6001494"/>
+            <a:off x="3545742" y="4903474"/>
             <a:ext cx="1506878" cy="448679"/>
           </a:xfrm>
           <a:prstGeom prst="rect">
@@ -4465,8 +4197,22 @@
                 <a:cs typeface="Arial"/>
                 <a:sym typeface="Helvetica Light"/>
               </a:rPr>
-              <a:t>Articles Service API</a:t>
-            </a:r>
+              <a:t>Web-API</a:t>
+            </a:r>
+            <a:endParaRPr kumimoji="0" lang="en-US" sz="1200" b="0" i="0" u="none" strike="noStrike" cap="none" spc="0" normalizeH="0" baseline="0" dirty="0" smtClean="0">
+              <a:ln>
+                <a:noFill/>
+              </a:ln>
+              <a:solidFill>
+                <a:srgbClr val="000000"/>
+              </a:solidFill>
+              <a:effectLst/>
+              <a:uFillTx/>
+              <a:latin typeface="Arial"/>
+              <a:ea typeface="+mn-ea"/>
+              <a:cs typeface="Arial"/>
+              <a:sym typeface="Helvetica Light"/>
+            </a:endParaRPr>
           </a:p>
           <a:p>
             <a:pPr marL="0" marR="0" indent="0" defTabSz="584200" rtl="0" fontAlgn="auto" latinLnBrk="1" hangingPunct="0">
@@ -4493,7 +4239,7 @@
                 <a:latin typeface="Arial"/>
                 <a:cs typeface="Arial"/>
               </a:rPr>
-              <a:t>v1</a:t>
+              <a:t>v2</a:t>
             </a:r>
             <a:endParaRPr kumimoji="0" lang="en-US" sz="1200" b="0" i="0" u="none" strike="noStrike" cap="none" spc="0" normalizeH="0" baseline="0" dirty="0">
               <a:ln>
@@ -4520,7 +4266,7 @@
         </p:nvGrpSpPr>
         <p:grpSpPr>
           <a:xfrm>
-            <a:off x="6106539" y="5348490"/>
+            <a:off x="6106539" y="4842446"/>
             <a:ext cx="707233" cy="707233"/>
             <a:chOff x="394759" y="4656919"/>
             <a:chExt cx="707233" cy="707233"/>
@@ -4650,8 +4396,8 @@
         </p:nvSpPr>
         <p:spPr>
           <a:xfrm>
-            <a:off x="5699221" y="6022064"/>
-            <a:ext cx="1506878" cy="448679"/>
+            <a:off x="5699221" y="5608353"/>
+            <a:ext cx="1506878" cy="264013"/>
           </a:xfrm>
           <a:prstGeom prst="rect">
             <a:avLst/>
@@ -4712,37 +4458,9 @@
                 <a:cs typeface="Arial"/>
                 <a:sym typeface="Helvetica Light"/>
               </a:rPr>
-              <a:t>Articles Core Service</a:t>
-            </a:r>
-          </a:p>
-          <a:p>
-            <a:pPr marL="0" marR="0" indent="0" defTabSz="584200" rtl="0" fontAlgn="auto" latinLnBrk="1" hangingPunct="0">
-              <a:lnSpc>
-                <a:spcPct val="100000"/>
-              </a:lnSpc>
-              <a:spcBef>
-                <a:spcPts val="0"/>
-              </a:spcBef>
-              <a:spcAft>
-                <a:spcPts val="0"/>
-              </a:spcAft>
-              <a:buClrTx/>
-              <a:buSzTx/>
-              <a:buFontTx/>
-              <a:buNone/>
-              <a:tabLst/>
-            </a:pPr>
-            <a:r>
-              <a:rPr lang="en-US" sz="1200" dirty="0" smtClean="0">
-                <a:solidFill>
-                  <a:srgbClr val="000000"/>
-                </a:solidFill>
-                <a:latin typeface="Arial"/>
-                <a:cs typeface="Arial"/>
-              </a:rPr>
-              <a:t>v1</a:t>
-            </a:r>
-            <a:endParaRPr kumimoji="0" lang="en-US" sz="1200" b="0" i="0" u="none" strike="noStrike" cap="none" spc="0" normalizeH="0" baseline="0" dirty="0">
+              <a:t>Authors Service</a:t>
+            </a:r>
+            <a:endParaRPr kumimoji="0" lang="en-US" sz="1200" b="0" i="0" u="none" strike="noStrike" cap="none" spc="0" normalizeH="0" baseline="0" dirty="0" smtClean="0">
               <a:ln>
                 <a:noFill/>
               </a:ln>
@@ -4775,7 +4493,7 @@
         </p:blipFill>
         <p:spPr>
           <a:xfrm>
-            <a:off x="5677595" y="5028542"/>
+            <a:off x="5677595" y="4522498"/>
             <a:ext cx="779457" cy="476768"/>
           </a:xfrm>
           <a:prstGeom prst="rect">
@@ -4786,15 +4504,13 @@
       <p:cxnSp>
         <p:nvCxnSpPr>
           <p:cNvPr id="108" name="Straight Arrow Connector 62"/>
-          <p:cNvCxnSpPr>
-            <a:endCxn id="96" idx="1"/>
-          </p:cNvCxnSpPr>
+          <p:cNvCxnSpPr/>
           <p:nvPr/>
         </p:nvCxnSpPr>
         <p:spPr>
           <a:xfrm>
-            <a:off x="3043280" y="4217163"/>
-            <a:ext cx="783669" cy="1461657"/>
+            <a:off x="3017401" y="3981695"/>
+            <a:ext cx="849837" cy="467861"/>
           </a:xfrm>
           <a:prstGeom prst="straightConnector1">
             <a:avLst/>
@@ -4834,7 +4550,7 @@
         </p:nvSpPr>
         <p:spPr>
           <a:xfrm>
-            <a:off x="3463085" y="7412539"/>
+            <a:off x="3577670" y="7068808"/>
             <a:ext cx="1365428" cy="264013"/>
           </a:xfrm>
           <a:prstGeom prst="rect">
@@ -4894,73 +4610,8 @@
         </p:nvCxnSpPr>
         <p:spPr>
           <a:xfrm>
-            <a:off x="3007336" y="4289047"/>
-            <a:ext cx="694922" cy="2779494"/>
-          </a:xfrm>
-          <a:prstGeom prst="straightConnector1">
-            <a:avLst/>
-          </a:prstGeom>
-          <a:noFill/>
-          <a:ln w="12700" cap="flat" cmpd="sng">
-            <a:solidFill>
-              <a:schemeClr val="bg1">
-                <a:lumMod val="85000"/>
-              </a:schemeClr>
-            </a:solidFill>
-            <a:prstDash val="solid"/>
-            <a:miter lim="400000"/>
-            <a:headEnd type="none"/>
-            <a:tailEnd type="none"/>
-          </a:ln>
-          <a:effectLst/>
-        </p:spPr>
-        <p:style>
-          <a:lnRef idx="0">
-            <a:scrgbClr r="0" g="0" b="0"/>
-          </a:lnRef>
-          <a:fillRef idx="0">
-            <a:scrgbClr r="0" g="0" b="0"/>
-          </a:fillRef>
-          <a:effectRef idx="0">
-            <a:scrgbClr r="0" g="0" b="0"/>
-          </a:effectRef>
-          <a:fontRef idx="none"/>
-        </p:style>
-      </p:cxnSp>
-      <p:pic>
-        <p:nvPicPr>
-          <p:cNvPr id="4" name="Picture 3"/>
-          <p:cNvPicPr>
-            <a:picLocks noChangeAspect="1"/>
-          </p:cNvPicPr>
-          <p:nvPr/>
-        </p:nvPicPr>
-        <p:blipFill>
-          <a:blip r:embed="rId9"/>
-          <a:stretch>
-            <a:fillRect/>
-          </a:stretch>
-        </p:blipFill>
-        <p:spPr>
-          <a:xfrm>
-            <a:off x="3524299" y="5043885"/>
-            <a:ext cx="779457" cy="476768"/>
-          </a:xfrm>
-          <a:prstGeom prst="rect">
-            <a:avLst/>
-          </a:prstGeom>
-        </p:spPr>
-      </p:pic>
-      <p:cxnSp>
-        <p:nvCxnSpPr>
-          <p:cNvPr id="119" name="Straight Arrow Connector 62"/>
-          <p:cNvCxnSpPr/>
-          <p:nvPr/>
-        </p:nvCxnSpPr>
-        <p:spPr>
-          <a:xfrm>
-            <a:off x="4792567" y="5690251"/>
-            <a:ext cx="1090309" cy="0"/>
+            <a:off x="2960108" y="4105813"/>
+            <a:ext cx="742150" cy="2695384"/>
           </a:xfrm>
           <a:prstGeom prst="straightConnector1">
             <a:avLst/>
@@ -4994,96 +4645,16 @@
       </p:cxnSp>
       <p:cxnSp>
         <p:nvCxnSpPr>
-          <p:cNvPr id="120" name="Straight Arrow Connector 62"/>
-          <p:cNvCxnSpPr/>
+          <p:cNvPr id="119" name="Straight Arrow Connector 62"/>
+          <p:cNvCxnSpPr>
+            <a:stCxn id="96" idx="3"/>
+          </p:cNvCxnSpPr>
           <p:nvPr/>
         </p:nvCxnSpPr>
         <p:spPr>
-          <a:xfrm flipV="1">
-            <a:off x="6968303" y="4168719"/>
-            <a:ext cx="1394726" cy="1"/>
-          </a:xfrm>
-          <a:prstGeom prst="straightConnector1">
-            <a:avLst/>
-          </a:prstGeom>
-          <a:noFill/>
-          <a:ln w="12700" cap="flat" cmpd="sng">
-            <a:solidFill>
-              <a:schemeClr val="bg1">
-                <a:lumMod val="85000"/>
-              </a:schemeClr>
-            </a:solidFill>
-            <a:prstDash val="solid"/>
-            <a:miter lim="400000"/>
-            <a:headEnd type="none"/>
-            <a:tailEnd type="none"/>
-          </a:ln>
-          <a:effectLst/>
-        </p:spPr>
-        <p:style>
-          <a:lnRef idx="0">
-            <a:scrgbClr r="0" g="0" b="0"/>
-          </a:lnRef>
-          <a:fillRef idx="0">
-            <a:scrgbClr r="0" g="0" b="0"/>
-          </a:fillRef>
-          <a:effectRef idx="0">
-            <a:scrgbClr r="0" g="0" b="0"/>
-          </a:effectRef>
-          <a:fontRef idx="none"/>
-        </p:style>
-      </p:cxnSp>
-      <p:cxnSp>
-        <p:nvCxnSpPr>
-          <p:cNvPr id="124" name="Straight Arrow Connector 62"/>
-          <p:cNvCxnSpPr/>
-          <p:nvPr/>
-        </p:nvCxnSpPr>
-        <p:spPr>
           <a:xfrm>
-            <a:off x="6897938" y="2704258"/>
-            <a:ext cx="1441129" cy="1405080"/>
-          </a:xfrm>
-          <a:prstGeom prst="straightConnector1">
-            <a:avLst/>
-          </a:prstGeom>
-          <a:noFill/>
-          <a:ln w="12700" cap="flat" cmpd="sng">
-            <a:solidFill>
-              <a:schemeClr val="bg1">
-                <a:lumMod val="85000"/>
-              </a:schemeClr>
-            </a:solidFill>
-            <a:prstDash val="solid"/>
-            <a:miter lim="400000"/>
-            <a:headEnd type="none"/>
-            <a:tailEnd type="none"/>
-          </a:ln>
-          <a:effectLst/>
-        </p:spPr>
-        <p:style>
-          <a:lnRef idx="0">
-            <a:scrgbClr r="0" g="0" b="0"/>
-          </a:lnRef>
-          <a:fillRef idx="0">
-            <a:scrgbClr r="0" g="0" b="0"/>
-          </a:fillRef>
-          <a:effectRef idx="0">
-            <a:scrgbClr r="0" g="0" b="0"/>
-          </a:effectRef>
-          <a:fontRef idx="none"/>
-        </p:style>
-      </p:cxnSp>
-      <p:cxnSp>
-        <p:nvCxnSpPr>
-          <p:cNvPr id="126" name="Straight Arrow Connector 62"/>
-          <p:cNvCxnSpPr/>
-          <p:nvPr/>
-        </p:nvCxnSpPr>
-        <p:spPr>
-          <a:xfrm flipV="1">
-            <a:off x="6909920" y="4229144"/>
-            <a:ext cx="1429147" cy="1494219"/>
+            <a:off x="4694099" y="4580800"/>
+            <a:ext cx="1369348" cy="689930"/>
           </a:xfrm>
           <a:prstGeom prst="straightConnector1">
             <a:avLst/>
@@ -5131,7 +4702,7 @@
         </p:blipFill>
         <p:spPr>
           <a:xfrm>
-            <a:off x="3671822" y="6466639"/>
+            <a:off x="3786407" y="6122908"/>
             <a:ext cx="307414" cy="348208"/>
           </a:xfrm>
           <a:prstGeom prst="rect">
@@ -5147,7 +4718,7 @@
         </p:nvGrpSpPr>
         <p:grpSpPr>
           <a:xfrm>
-            <a:off x="3814397" y="6704563"/>
+            <a:off x="3928982" y="6360832"/>
             <a:ext cx="707235" cy="707233"/>
             <a:chOff x="555452" y="2050875"/>
             <a:chExt cx="707235" cy="707233"/>
@@ -5269,6 +4840,759 @@
           </p:spPr>
         </p:pic>
       </p:grpSp>
+      <p:pic>
+        <p:nvPicPr>
+          <p:cNvPr id="84" name="Picture 83"/>
+          <p:cNvPicPr>
+            <a:picLocks noChangeAspect="1"/>
+          </p:cNvPicPr>
+          <p:nvPr/>
+        </p:nvPicPr>
+        <p:blipFill>
+          <a:blip r:embed="rId6"/>
+          <a:stretch>
+            <a:fillRect/>
+          </a:stretch>
+        </p:blipFill>
+        <p:spPr>
+          <a:xfrm>
+            <a:off x="3598330" y="3872651"/>
+            <a:ext cx="831816" cy="524254"/>
+          </a:xfrm>
+          <a:prstGeom prst="rect">
+            <a:avLst/>
+          </a:prstGeom>
+        </p:spPr>
+      </p:pic>
+      <p:cxnSp>
+        <p:nvCxnSpPr>
+          <p:cNvPr id="62" name="Straight Arrow Connector 62"/>
+          <p:cNvCxnSpPr/>
+          <p:nvPr/>
+        </p:nvCxnSpPr>
+        <p:spPr>
+          <a:xfrm flipV="1">
+            <a:off x="4716696" y="2740403"/>
+            <a:ext cx="1184423" cy="1746983"/>
+          </a:xfrm>
+          <a:prstGeom prst="straightConnector1">
+            <a:avLst/>
+          </a:prstGeom>
+          <a:noFill/>
+          <a:ln w="12700" cap="flat" cmpd="sng">
+            <a:solidFill>
+              <a:schemeClr val="bg1">
+                <a:lumMod val="85000"/>
+              </a:schemeClr>
+            </a:solidFill>
+            <a:prstDash val="solid"/>
+            <a:miter lim="400000"/>
+            <a:headEnd type="none"/>
+            <a:tailEnd type="none"/>
+          </a:ln>
+          <a:effectLst/>
+        </p:spPr>
+        <p:style>
+          <a:lnRef idx="0">
+            <a:scrgbClr r="0" g="0" b="0"/>
+          </a:lnRef>
+          <a:fillRef idx="0">
+            <a:scrgbClr r="0" g="0" b="0"/>
+          </a:fillRef>
+          <a:effectRef idx="0">
+            <a:scrgbClr r="0" g="0" b="0"/>
+          </a:effectRef>
+          <a:fontRef idx="none"/>
+        </p:style>
+      </p:cxnSp>
+      <p:cxnSp>
+        <p:nvCxnSpPr>
+          <p:cNvPr id="69" name="Straight Arrow Connector 62"/>
+          <p:cNvCxnSpPr/>
+          <p:nvPr/>
+        </p:nvCxnSpPr>
+        <p:spPr>
+          <a:xfrm>
+            <a:off x="4721985" y="3291017"/>
+            <a:ext cx="1293719" cy="1960616"/>
+          </a:xfrm>
+          <a:prstGeom prst="straightConnector1">
+            <a:avLst/>
+          </a:prstGeom>
+          <a:noFill/>
+          <a:ln w="12700" cap="flat" cmpd="sng">
+            <a:solidFill>
+              <a:schemeClr val="bg1">
+                <a:lumMod val="85000"/>
+              </a:schemeClr>
+            </a:solidFill>
+            <a:prstDash val="solid"/>
+            <a:miter lim="400000"/>
+            <a:headEnd type="none"/>
+            <a:tailEnd type="none"/>
+          </a:ln>
+          <a:effectLst/>
+        </p:spPr>
+        <p:style>
+          <a:lnRef idx="0">
+            <a:scrgbClr r="0" g="0" b="0"/>
+          </a:lnRef>
+          <a:fillRef idx="0">
+            <a:scrgbClr r="0" g="0" b="0"/>
+          </a:fillRef>
+          <a:effectRef idx="0">
+            <a:scrgbClr r="0" g="0" b="0"/>
+          </a:effectRef>
+          <a:fontRef idx="none"/>
+        </p:style>
+      </p:cxnSp>
+      <p:cxnSp>
+        <p:nvCxnSpPr>
+          <p:cNvPr id="71" name="Straight Arrow Connector 62"/>
+          <p:cNvCxnSpPr/>
+          <p:nvPr/>
+        </p:nvCxnSpPr>
+        <p:spPr>
+          <a:xfrm flipV="1">
+            <a:off x="7028812" y="3848006"/>
+            <a:ext cx="1326332" cy="1340694"/>
+          </a:xfrm>
+          <a:prstGeom prst="straightConnector1">
+            <a:avLst/>
+          </a:prstGeom>
+          <a:noFill/>
+          <a:ln w="12700" cap="flat" cmpd="sng">
+            <a:solidFill>
+              <a:schemeClr val="bg1">
+                <a:lumMod val="85000"/>
+              </a:schemeClr>
+            </a:solidFill>
+            <a:prstDash val="solid"/>
+            <a:miter lim="400000"/>
+            <a:headEnd type="none"/>
+            <a:tailEnd type="none"/>
+          </a:ln>
+          <a:effectLst/>
+        </p:spPr>
+        <p:style>
+          <a:lnRef idx="0">
+            <a:scrgbClr r="0" g="0" b="0"/>
+          </a:lnRef>
+          <a:fillRef idx="0">
+            <a:scrgbClr r="0" g="0" b="0"/>
+          </a:fillRef>
+          <a:effectRef idx="0">
+            <a:scrgbClr r="0" g="0" b="0"/>
+          </a:effectRef>
+          <a:fontRef idx="none"/>
+        </p:style>
+      </p:cxnSp>
+      <p:pic>
+        <p:nvPicPr>
+          <p:cNvPr id="17" name="Picture 16"/>
+          <p:cNvPicPr>
+            <a:picLocks noChangeAspect="1"/>
+          </p:cNvPicPr>
+          <p:nvPr/>
+        </p:nvPicPr>
+        <p:blipFill>
+          <a:blip r:embed="rId12"/>
+          <a:stretch>
+            <a:fillRect/>
+          </a:stretch>
+        </p:blipFill>
+        <p:spPr>
+          <a:xfrm>
+            <a:off x="8507924" y="2332834"/>
+            <a:ext cx="600900" cy="600900"/>
+          </a:xfrm>
+          <a:prstGeom prst="rect">
+            <a:avLst/>
+          </a:prstGeom>
+        </p:spPr>
+      </p:pic>
+      <p:sp>
+        <p:nvSpPr>
+          <p:cNvPr id="73" name="TextBox 72"/>
+          <p:cNvSpPr txBox="1"/>
+          <p:nvPr/>
+        </p:nvSpPr>
+        <p:spPr>
+          <a:xfrm>
+            <a:off x="8258332" y="2971303"/>
+            <a:ext cx="1218324" cy="264013"/>
+          </a:xfrm>
+          <a:prstGeom prst="rect">
+            <a:avLst/>
+          </a:prstGeom>
+          <a:noFill/>
+          <a:ln w="3175" cap="flat">
+            <a:noFill/>
+            <a:miter lim="400000"/>
+          </a:ln>
+          <a:effectLst/>
+        </p:spPr>
+        <p:style>
+          <a:lnRef idx="0">
+            <a:scrgbClr r="0" g="0" b="0"/>
+          </a:lnRef>
+          <a:fillRef idx="0">
+            <a:scrgbClr r="0" g="0" b="0"/>
+          </a:fillRef>
+          <a:effectRef idx="0">
+            <a:scrgbClr r="0" g="0" b="0"/>
+          </a:effectRef>
+          <a:fontRef idx="none"/>
+        </p:style>
+        <p:txBody>
+          <a:bodyPr rot="0" spcFirstLastPara="1" vertOverflow="overflow" horzOverflow="overflow" vert="horz" wrap="square" lIns="39290" tIns="39290" rIns="39290" bIns="39290" numCol="1" spcCol="38100" rtlCol="0" anchor="ctr">
+            <a:spAutoFit/>
+          </a:bodyPr>
+          <a:lstStyle/>
+          <a:p>
+            <a:pPr marL="0" marR="0" indent="0" defTabSz="584200" rtl="0" fontAlgn="auto" latinLnBrk="1" hangingPunct="0">
+              <a:lnSpc>
+                <a:spcPct val="100000"/>
+              </a:lnSpc>
+              <a:spcBef>
+                <a:spcPts val="0"/>
+              </a:spcBef>
+              <a:spcAft>
+                <a:spcPts val="0"/>
+              </a:spcAft>
+              <a:buClrTx/>
+              <a:buSzTx/>
+              <a:buFontTx/>
+              <a:buNone/>
+              <a:tabLst/>
+            </a:pPr>
+            <a:r>
+              <a:rPr kumimoji="0" lang="en-US" sz="1200" b="0" i="0" u="none" strike="noStrike" cap="none" spc="0" normalizeH="0" baseline="0" dirty="0" smtClean="0">
+                <a:ln>
+                  <a:noFill/>
+                </a:ln>
+                <a:solidFill>
+                  <a:srgbClr val="000000"/>
+                </a:solidFill>
+                <a:effectLst/>
+                <a:uFillTx/>
+                <a:latin typeface="Arial"/>
+                <a:ea typeface="+mn-ea"/>
+                <a:cs typeface="Arial"/>
+                <a:sym typeface="Helvetica Light"/>
+              </a:rPr>
+              <a:t>ElephantSQL</a:t>
+            </a:r>
+            <a:endParaRPr kumimoji="0" lang="en-US" sz="1200" b="0" i="0" u="none" strike="noStrike" cap="none" spc="0" normalizeH="0" baseline="0" dirty="0">
+              <a:ln>
+                <a:noFill/>
+              </a:ln>
+              <a:solidFill>
+                <a:srgbClr val="000000"/>
+              </a:solidFill>
+              <a:effectLst/>
+              <a:uFillTx/>
+              <a:latin typeface="Arial"/>
+              <a:ea typeface="+mn-ea"/>
+              <a:cs typeface="Arial"/>
+              <a:sym typeface="Helvetica Light"/>
+            </a:endParaRPr>
+          </a:p>
+        </p:txBody>
+      </p:sp>
+      <p:cxnSp>
+        <p:nvCxnSpPr>
+          <p:cNvPr id="75" name="Straight Arrow Connector 62"/>
+          <p:cNvCxnSpPr/>
+          <p:nvPr/>
+        </p:nvCxnSpPr>
+        <p:spPr>
+          <a:xfrm flipV="1">
+            <a:off x="6866483" y="2644908"/>
+            <a:ext cx="1469564" cy="3915"/>
+          </a:xfrm>
+          <a:prstGeom prst="straightConnector1">
+            <a:avLst/>
+          </a:prstGeom>
+          <a:noFill/>
+          <a:ln w="12700" cap="flat" cmpd="sng">
+            <a:solidFill>
+              <a:schemeClr val="bg1">
+                <a:lumMod val="85000"/>
+              </a:schemeClr>
+            </a:solidFill>
+            <a:prstDash val="solid"/>
+            <a:miter lim="400000"/>
+            <a:headEnd type="none"/>
+            <a:tailEnd type="none"/>
+          </a:ln>
+          <a:effectLst/>
+        </p:spPr>
+        <p:style>
+          <a:lnRef idx="0">
+            <a:scrgbClr r="0" g="0" b="0"/>
+          </a:lnRef>
+          <a:fillRef idx="0">
+            <a:scrgbClr r="0" g="0" b="0"/>
+          </a:fillRef>
+          <a:effectRef idx="0">
+            <a:scrgbClr r="0" g="0" b="0"/>
+          </a:effectRef>
+          <a:fontRef idx="none"/>
+        </p:style>
+      </p:cxnSp>
+      <p:pic>
+        <p:nvPicPr>
+          <p:cNvPr id="23" name="Picture 22"/>
+          <p:cNvPicPr>
+            <a:picLocks noChangeAspect="1"/>
+          </p:cNvPicPr>
+          <p:nvPr/>
+        </p:nvPicPr>
+        <p:blipFill>
+          <a:blip r:embed="rId13"/>
+          <a:stretch>
+            <a:fillRect/>
+          </a:stretch>
+        </p:blipFill>
+        <p:spPr>
+          <a:xfrm>
+            <a:off x="8158781" y="6490511"/>
+            <a:ext cx="635000" cy="635000"/>
+          </a:xfrm>
+          <a:prstGeom prst="rect">
+            <a:avLst/>
+          </a:prstGeom>
+        </p:spPr>
+      </p:pic>
+      <p:sp>
+        <p:nvSpPr>
+          <p:cNvPr id="87" name="TextBox 86"/>
+          <p:cNvSpPr txBox="1"/>
+          <p:nvPr/>
+        </p:nvSpPr>
+        <p:spPr>
+          <a:xfrm>
+            <a:off x="7875609" y="7191001"/>
+            <a:ext cx="1218324" cy="264013"/>
+          </a:xfrm>
+          <a:prstGeom prst="rect">
+            <a:avLst/>
+          </a:prstGeom>
+          <a:noFill/>
+          <a:ln w="3175" cap="flat">
+            <a:noFill/>
+            <a:miter lim="400000"/>
+          </a:ln>
+          <a:effectLst/>
+        </p:spPr>
+        <p:style>
+          <a:lnRef idx="0">
+            <a:scrgbClr r="0" g="0" b="0"/>
+          </a:lnRef>
+          <a:fillRef idx="0">
+            <a:scrgbClr r="0" g="0" b="0"/>
+          </a:fillRef>
+          <a:effectRef idx="0">
+            <a:scrgbClr r="0" g="0" b="0"/>
+          </a:effectRef>
+          <a:fontRef idx="none"/>
+        </p:style>
+        <p:txBody>
+          <a:bodyPr rot="0" spcFirstLastPara="1" vertOverflow="overflow" horzOverflow="overflow" vert="horz" wrap="square" lIns="39290" tIns="39290" rIns="39290" bIns="39290" numCol="1" spcCol="38100" rtlCol="0" anchor="ctr">
+            <a:spAutoFit/>
+          </a:bodyPr>
+          <a:lstStyle/>
+          <a:p>
+            <a:pPr marL="0" marR="0" indent="0" defTabSz="584200" rtl="0" fontAlgn="auto" latinLnBrk="1" hangingPunct="0">
+              <a:lnSpc>
+                <a:spcPct val="100000"/>
+              </a:lnSpc>
+              <a:spcBef>
+                <a:spcPts val="0"/>
+              </a:spcBef>
+              <a:spcAft>
+                <a:spcPts val="0"/>
+              </a:spcAft>
+              <a:buClrTx/>
+              <a:buSzTx/>
+              <a:buFontTx/>
+              <a:buNone/>
+              <a:tabLst/>
+            </a:pPr>
+            <a:r>
+              <a:rPr kumimoji="0" lang="en-US" sz="1200" b="0" i="0" u="none" strike="noStrike" cap="none" spc="0" normalizeH="0" baseline="0" dirty="0" smtClean="0">
+                <a:ln>
+                  <a:noFill/>
+                </a:ln>
+                <a:solidFill>
+                  <a:srgbClr val="000000"/>
+                </a:solidFill>
+                <a:effectLst/>
+                <a:uFillTx/>
+                <a:latin typeface="Arial"/>
+                <a:ea typeface="+mn-ea"/>
+                <a:cs typeface="Arial"/>
+                <a:sym typeface="Helvetica Light"/>
+              </a:rPr>
+              <a:t>App ID</a:t>
+            </a:r>
+            <a:endParaRPr kumimoji="0" lang="en-US" sz="1200" b="0" i="0" u="none" strike="noStrike" cap="none" spc="0" normalizeH="0" baseline="0" dirty="0">
+              <a:ln>
+                <a:noFill/>
+              </a:ln>
+              <a:solidFill>
+                <a:srgbClr val="000000"/>
+              </a:solidFill>
+              <a:effectLst/>
+              <a:uFillTx/>
+              <a:latin typeface="Arial"/>
+              <a:ea typeface="+mn-ea"/>
+              <a:cs typeface="Arial"/>
+              <a:sym typeface="Helvetica Light"/>
+            </a:endParaRPr>
+          </a:p>
+        </p:txBody>
+      </p:sp>
+      <p:pic>
+        <p:nvPicPr>
+          <p:cNvPr id="24" name="Picture 23"/>
+          <p:cNvPicPr>
+            <a:picLocks noChangeAspect="1"/>
+          </p:cNvPicPr>
+          <p:nvPr/>
+        </p:nvPicPr>
+        <p:blipFill>
+          <a:blip r:embed="rId14"/>
+          <a:stretch>
+            <a:fillRect/>
+          </a:stretch>
+        </p:blipFill>
+        <p:spPr>
+          <a:xfrm>
+            <a:off x="9082061" y="6468451"/>
+            <a:ext cx="705394" cy="705394"/>
+          </a:xfrm>
+          <a:prstGeom prst="rect">
+            <a:avLst/>
+          </a:prstGeom>
+        </p:spPr>
+      </p:pic>
+      <p:pic>
+        <p:nvPicPr>
+          <p:cNvPr id="89" name="Picture 88"/>
+          <p:cNvPicPr>
+            <a:picLocks noChangeAspect="1"/>
+          </p:cNvPicPr>
+          <p:nvPr/>
+        </p:nvPicPr>
+        <p:blipFill>
+          <a:blip r:embed="rId15"/>
+          <a:stretch>
+            <a:fillRect/>
+          </a:stretch>
+        </p:blipFill>
+        <p:spPr>
+          <a:xfrm>
+            <a:off x="8068332" y="5037466"/>
+            <a:ext cx="611121" cy="689234"/>
+          </a:xfrm>
+          <a:prstGeom prst="rect">
+            <a:avLst/>
+          </a:prstGeom>
+        </p:spPr>
+      </p:pic>
+      <p:sp>
+        <p:nvSpPr>
+          <p:cNvPr id="90" name="TextBox 89"/>
+          <p:cNvSpPr txBox="1"/>
+          <p:nvPr/>
+        </p:nvSpPr>
+        <p:spPr>
+          <a:xfrm>
+            <a:off x="7944199" y="5854974"/>
+            <a:ext cx="911439" cy="264013"/>
+          </a:xfrm>
+          <a:prstGeom prst="rect">
+            <a:avLst/>
+          </a:prstGeom>
+          <a:noFill/>
+          <a:ln w="3175" cap="flat">
+            <a:noFill/>
+            <a:miter lim="400000"/>
+          </a:ln>
+          <a:effectLst/>
+        </p:spPr>
+        <p:style>
+          <a:lnRef idx="0">
+            <a:scrgbClr r="0" g="0" b="0"/>
+          </a:lnRef>
+          <a:fillRef idx="0">
+            <a:scrgbClr r="0" g="0" b="0"/>
+          </a:fillRef>
+          <a:effectRef idx="0">
+            <a:scrgbClr r="0" g="0" b="0"/>
+          </a:effectRef>
+          <a:fontRef idx="none"/>
+        </p:style>
+        <p:txBody>
+          <a:bodyPr rot="0" spcFirstLastPara="1" vertOverflow="overflow" horzOverflow="overflow" vert="horz" wrap="square" lIns="39290" tIns="39290" rIns="39290" bIns="39290" numCol="1" spcCol="38100" rtlCol="0" anchor="ctr">
+            <a:spAutoFit/>
+          </a:bodyPr>
+          <a:lstStyle/>
+          <a:p>
+            <a:pPr marL="0" marR="0" indent="0" defTabSz="584200" rtl="0" fontAlgn="auto" latinLnBrk="1" hangingPunct="0">
+              <a:lnSpc>
+                <a:spcPct val="100000"/>
+              </a:lnSpc>
+              <a:spcBef>
+                <a:spcPts val="0"/>
+              </a:spcBef>
+              <a:spcAft>
+                <a:spcPts val="0"/>
+              </a:spcAft>
+              <a:buClrTx/>
+              <a:buSzTx/>
+              <a:buFontTx/>
+              <a:buNone/>
+              <a:tabLst/>
+            </a:pPr>
+            <a:r>
+              <a:rPr kumimoji="0" lang="en-US" sz="1200" b="0" i="0" u="none" strike="noStrike" cap="none" spc="0" normalizeH="0" baseline="0" dirty="0" smtClean="0">
+                <a:ln>
+                  <a:noFill/>
+                </a:ln>
+                <a:solidFill>
+                  <a:srgbClr val="000000"/>
+                </a:solidFill>
+                <a:effectLst/>
+                <a:uFillTx/>
+                <a:latin typeface="Arial"/>
+                <a:ea typeface="+mn-ea"/>
+                <a:cs typeface="Arial"/>
+                <a:sym typeface="Helvetica Light"/>
+              </a:rPr>
+              <a:t>LogDNA</a:t>
+            </a:r>
+            <a:endParaRPr kumimoji="0" lang="en-US" sz="1200" b="0" i="0" u="none" strike="noStrike" cap="none" spc="0" normalizeH="0" baseline="0" dirty="0">
+              <a:ln>
+                <a:noFill/>
+              </a:ln>
+              <a:solidFill>
+                <a:srgbClr val="000000"/>
+              </a:solidFill>
+              <a:effectLst/>
+              <a:uFillTx/>
+              <a:latin typeface="Arial"/>
+              <a:ea typeface="+mn-ea"/>
+              <a:cs typeface="Arial"/>
+              <a:sym typeface="Helvetica Light"/>
+            </a:endParaRPr>
+          </a:p>
+        </p:txBody>
+      </p:sp>
+      <p:pic>
+        <p:nvPicPr>
+          <p:cNvPr id="91" name="Picture 90"/>
+          <p:cNvPicPr>
+            <a:picLocks noChangeAspect="1"/>
+          </p:cNvPicPr>
+          <p:nvPr/>
+        </p:nvPicPr>
+        <p:blipFill>
+          <a:blip r:embed="rId16"/>
+          <a:stretch>
+            <a:fillRect/>
+          </a:stretch>
+        </p:blipFill>
+        <p:spPr>
+          <a:xfrm>
+            <a:off x="9039312" y="5032005"/>
+            <a:ext cx="732887" cy="732887"/>
+          </a:xfrm>
+          <a:prstGeom prst="rect">
+            <a:avLst/>
+          </a:prstGeom>
+        </p:spPr>
+      </p:pic>
+      <p:sp>
+        <p:nvSpPr>
+          <p:cNvPr id="93" name="TextBox 92"/>
+          <p:cNvSpPr txBox="1"/>
+          <p:nvPr/>
+        </p:nvSpPr>
+        <p:spPr>
+          <a:xfrm>
+            <a:off x="8964209" y="5845050"/>
+            <a:ext cx="995122" cy="264013"/>
+          </a:xfrm>
+          <a:prstGeom prst="rect">
+            <a:avLst/>
+          </a:prstGeom>
+          <a:noFill/>
+          <a:ln w="3175" cap="flat">
+            <a:noFill/>
+            <a:miter lim="400000"/>
+          </a:ln>
+          <a:effectLst/>
+        </p:spPr>
+        <p:style>
+          <a:lnRef idx="0">
+            <a:scrgbClr r="0" g="0" b="0"/>
+          </a:lnRef>
+          <a:fillRef idx="0">
+            <a:scrgbClr r="0" g="0" b="0"/>
+          </a:fillRef>
+          <a:effectRef idx="0">
+            <a:scrgbClr r="0" g="0" b="0"/>
+          </a:effectRef>
+          <a:fontRef idx="none"/>
+        </p:style>
+        <p:txBody>
+          <a:bodyPr rot="0" spcFirstLastPara="1" vertOverflow="overflow" horzOverflow="overflow" vert="horz" wrap="square" lIns="39290" tIns="39290" rIns="39290" bIns="39290" numCol="1" spcCol="38100" rtlCol="0" anchor="ctr">
+            <a:spAutoFit/>
+          </a:bodyPr>
+          <a:lstStyle/>
+          <a:p>
+            <a:pPr marL="0" marR="0" indent="0" defTabSz="584200" rtl="0" fontAlgn="auto" latinLnBrk="1" hangingPunct="0">
+              <a:lnSpc>
+                <a:spcPct val="100000"/>
+              </a:lnSpc>
+              <a:spcBef>
+                <a:spcPts val="0"/>
+              </a:spcBef>
+              <a:spcAft>
+                <a:spcPts val="0"/>
+              </a:spcAft>
+              <a:buClrTx/>
+              <a:buSzTx/>
+              <a:buFontTx/>
+              <a:buNone/>
+              <a:tabLst/>
+            </a:pPr>
+            <a:r>
+              <a:rPr kumimoji="0" lang="en-US" sz="1200" b="0" i="0" u="none" strike="noStrike" cap="none" spc="0" normalizeH="0" baseline="0" dirty="0" smtClean="0">
+                <a:ln>
+                  <a:noFill/>
+                </a:ln>
+                <a:solidFill>
+                  <a:srgbClr val="000000"/>
+                </a:solidFill>
+                <a:effectLst/>
+                <a:uFillTx/>
+                <a:latin typeface="Arial"/>
+                <a:ea typeface="+mn-ea"/>
+                <a:cs typeface="Arial"/>
+                <a:sym typeface="Helvetica Light"/>
+              </a:rPr>
+              <a:t>Sysdig</a:t>
+            </a:r>
+            <a:endParaRPr kumimoji="0" lang="en-US" sz="1200" b="0" i="0" u="none" strike="noStrike" cap="none" spc="0" normalizeH="0" baseline="0" dirty="0">
+              <a:ln>
+                <a:noFill/>
+              </a:ln>
+              <a:solidFill>
+                <a:srgbClr val="000000"/>
+              </a:solidFill>
+              <a:effectLst/>
+              <a:uFillTx/>
+              <a:latin typeface="Arial"/>
+              <a:ea typeface="+mn-ea"/>
+              <a:cs typeface="Arial"/>
+              <a:sym typeface="Helvetica Light"/>
+            </a:endParaRPr>
+          </a:p>
+        </p:txBody>
+      </p:sp>
+      <p:sp>
+        <p:nvSpPr>
+          <p:cNvPr id="94" name="TextBox 93"/>
+          <p:cNvSpPr txBox="1"/>
+          <p:nvPr/>
+        </p:nvSpPr>
+        <p:spPr>
+          <a:xfrm>
+            <a:off x="9052201" y="7209725"/>
+            <a:ext cx="862543" cy="264013"/>
+          </a:xfrm>
+          <a:prstGeom prst="rect">
+            <a:avLst/>
+          </a:prstGeom>
+          <a:noFill/>
+          <a:ln w="3175" cap="flat">
+            <a:noFill/>
+            <a:miter lim="400000"/>
+          </a:ln>
+          <a:effectLst/>
+        </p:spPr>
+        <p:style>
+          <a:lnRef idx="0">
+            <a:scrgbClr r="0" g="0" b="0"/>
+          </a:lnRef>
+          <a:fillRef idx="0">
+            <a:scrgbClr r="0" g="0" b="0"/>
+          </a:fillRef>
+          <a:effectRef idx="0">
+            <a:scrgbClr r="0" g="0" b="0"/>
+          </a:effectRef>
+          <a:fontRef idx="none"/>
+        </p:style>
+        <p:txBody>
+          <a:bodyPr rot="0" spcFirstLastPara="1" vertOverflow="overflow" horzOverflow="overflow" vert="horz" wrap="square" lIns="39290" tIns="39290" rIns="39290" bIns="39290" numCol="1" spcCol="38100" rtlCol="0" anchor="ctr">
+            <a:spAutoFit/>
+          </a:bodyPr>
+          <a:lstStyle/>
+          <a:p>
+            <a:pPr marL="0" marR="0" indent="0" defTabSz="584200" rtl="0" fontAlgn="auto" latinLnBrk="1" hangingPunct="0">
+              <a:lnSpc>
+                <a:spcPct val="100000"/>
+              </a:lnSpc>
+              <a:spcBef>
+                <a:spcPts val="0"/>
+              </a:spcBef>
+              <a:spcAft>
+                <a:spcPts val="0"/>
+              </a:spcAft>
+              <a:buClrTx/>
+              <a:buSzTx/>
+              <a:buFontTx/>
+              <a:buNone/>
+              <a:tabLst/>
+            </a:pPr>
+            <a:r>
+              <a:rPr kumimoji="0" lang="en-US" sz="1200" b="0" i="0" u="none" strike="noStrike" cap="none" spc="0" normalizeH="0" baseline="0" dirty="0" smtClean="0">
+                <a:ln>
+                  <a:noFill/>
+                </a:ln>
+                <a:solidFill>
+                  <a:srgbClr val="000000"/>
+                </a:solidFill>
+                <a:effectLst/>
+                <a:uFillTx/>
+                <a:latin typeface="Arial"/>
+                <a:ea typeface="+mn-ea"/>
+                <a:cs typeface="Arial"/>
+                <a:sym typeface="Helvetica Light"/>
+              </a:rPr>
+              <a:t>Registry</a:t>
+            </a:r>
+            <a:endParaRPr kumimoji="0" lang="en-US" sz="1200" b="0" i="0" u="none" strike="noStrike" cap="none" spc="0" normalizeH="0" baseline="0" dirty="0">
+              <a:ln>
+                <a:noFill/>
+              </a:ln>
+              <a:solidFill>
+                <a:srgbClr val="000000"/>
+              </a:solidFill>
+              <a:effectLst/>
+              <a:uFillTx/>
+              <a:latin typeface="Arial"/>
+              <a:ea typeface="+mn-ea"/>
+              <a:cs typeface="Arial"/>
+              <a:sym typeface="Helvetica Light"/>
+            </a:endParaRPr>
+          </a:p>
+        </p:txBody>
+      </p:sp>
     </p:spTree>
     <p:extLst>
       <p:ext uri="{BB962C8B-B14F-4D97-AF65-F5344CB8AC3E}">

</xml_diff>